<commit_message>
fixed the Doctor to Master ;
</commit_message>
<xml_diff>
--- a/source/drawing_table.pptx
+++ b/source/drawing_table.pptx
@@ -243,7 +243,7 @@
           <a:p>
             <a:fld id="{58161084-0ADB-4331-80CB-5F5779735B68}" type="datetimeFigureOut">
               <a:rPr lang="zh-CN" altLang="en-US" smtClean="0"/>
-              <a:t>2016/3/1</a:t>
+              <a:t>2016/5/14</a:t>
             </a:fld>
             <a:endParaRPr lang="zh-CN" altLang="en-US"/>
           </a:p>
@@ -413,7 +413,7 @@
           <a:p>
             <a:fld id="{58161084-0ADB-4331-80CB-5F5779735B68}" type="datetimeFigureOut">
               <a:rPr lang="zh-CN" altLang="en-US" smtClean="0"/>
-              <a:t>2016/3/1</a:t>
+              <a:t>2016/5/14</a:t>
             </a:fld>
             <a:endParaRPr lang="zh-CN" altLang="en-US"/>
           </a:p>
@@ -593,7 +593,7 @@
           <a:p>
             <a:fld id="{58161084-0ADB-4331-80CB-5F5779735B68}" type="datetimeFigureOut">
               <a:rPr lang="zh-CN" altLang="en-US" smtClean="0"/>
-              <a:t>2016/3/1</a:t>
+              <a:t>2016/5/14</a:t>
             </a:fld>
             <a:endParaRPr lang="zh-CN" altLang="en-US"/>
           </a:p>
@@ -763,7 +763,7 @@
           <a:p>
             <a:fld id="{58161084-0ADB-4331-80CB-5F5779735B68}" type="datetimeFigureOut">
               <a:rPr lang="zh-CN" altLang="en-US" smtClean="0"/>
-              <a:t>2016/3/1</a:t>
+              <a:t>2016/5/14</a:t>
             </a:fld>
             <a:endParaRPr lang="zh-CN" altLang="en-US"/>
           </a:p>
@@ -1009,7 +1009,7 @@
           <a:p>
             <a:fld id="{58161084-0ADB-4331-80CB-5F5779735B68}" type="datetimeFigureOut">
               <a:rPr lang="zh-CN" altLang="en-US" smtClean="0"/>
-              <a:t>2016/3/1</a:t>
+              <a:t>2016/5/14</a:t>
             </a:fld>
             <a:endParaRPr lang="zh-CN" altLang="en-US"/>
           </a:p>
@@ -1241,7 +1241,7 @@
           <a:p>
             <a:fld id="{58161084-0ADB-4331-80CB-5F5779735B68}" type="datetimeFigureOut">
               <a:rPr lang="zh-CN" altLang="en-US" smtClean="0"/>
-              <a:t>2016/3/1</a:t>
+              <a:t>2016/5/14</a:t>
             </a:fld>
             <a:endParaRPr lang="zh-CN" altLang="en-US"/>
           </a:p>
@@ -1608,7 +1608,7 @@
           <a:p>
             <a:fld id="{58161084-0ADB-4331-80CB-5F5779735B68}" type="datetimeFigureOut">
               <a:rPr lang="zh-CN" altLang="en-US" smtClean="0"/>
-              <a:t>2016/3/1</a:t>
+              <a:t>2016/5/14</a:t>
             </a:fld>
             <a:endParaRPr lang="zh-CN" altLang="en-US"/>
           </a:p>
@@ -1726,7 +1726,7 @@
           <a:p>
             <a:fld id="{58161084-0ADB-4331-80CB-5F5779735B68}" type="datetimeFigureOut">
               <a:rPr lang="zh-CN" altLang="en-US" smtClean="0"/>
-              <a:t>2016/3/1</a:t>
+              <a:t>2016/5/14</a:t>
             </a:fld>
             <a:endParaRPr lang="zh-CN" altLang="en-US"/>
           </a:p>
@@ -1821,7 +1821,7 @@
           <a:p>
             <a:fld id="{58161084-0ADB-4331-80CB-5F5779735B68}" type="datetimeFigureOut">
               <a:rPr lang="zh-CN" altLang="en-US" smtClean="0"/>
-              <a:t>2016/3/1</a:t>
+              <a:t>2016/5/14</a:t>
             </a:fld>
             <a:endParaRPr lang="zh-CN" altLang="en-US"/>
           </a:p>
@@ -2098,7 +2098,7 @@
           <a:p>
             <a:fld id="{58161084-0ADB-4331-80CB-5F5779735B68}" type="datetimeFigureOut">
               <a:rPr lang="zh-CN" altLang="en-US" smtClean="0"/>
-              <a:t>2016/3/1</a:t>
+              <a:t>2016/5/14</a:t>
             </a:fld>
             <a:endParaRPr lang="zh-CN" altLang="en-US"/>
           </a:p>
@@ -2351,7 +2351,7 @@
           <a:p>
             <a:fld id="{58161084-0ADB-4331-80CB-5F5779735B68}" type="datetimeFigureOut">
               <a:rPr lang="zh-CN" altLang="en-US" smtClean="0"/>
-              <a:t>2016/3/1</a:t>
+              <a:t>2016/5/14</a:t>
             </a:fld>
             <a:endParaRPr lang="zh-CN" altLang="en-US"/>
           </a:p>
@@ -2564,7 +2564,7 @@
           <a:p>
             <a:fld id="{58161084-0ADB-4331-80CB-5F5779735B68}" type="datetimeFigureOut">
               <a:rPr lang="zh-CN" altLang="en-US" smtClean="0"/>
-              <a:t>2016/3/1</a:t>
+              <a:t>2016/5/14</a:t>
             </a:fld>
             <a:endParaRPr lang="zh-CN" altLang="en-US"/>
           </a:p>
@@ -2977,7 +2977,7 @@
         </p:nvGrpSpPr>
         <p:grpSpPr>
           <a:xfrm>
-            <a:off x="2858536" y="2029736"/>
+            <a:off x="2659359" y="4163172"/>
             <a:ext cx="5841186" cy="2401271"/>
             <a:chOff x="2795161" y="2247019"/>
             <a:chExt cx="5841186" cy="2401271"/>
@@ -4569,6 +4569,1751 @@
           </p:txBody>
         </p:sp>
       </p:grpSp>
+      <p:grpSp>
+        <p:nvGrpSpPr>
+          <p:cNvPr id="30" name="组合 29"/>
+          <p:cNvGrpSpPr/>
+          <p:nvPr/>
+        </p:nvGrpSpPr>
+        <p:grpSpPr>
+          <a:xfrm>
+            <a:off x="3057382" y="829443"/>
+            <a:ext cx="4892281" cy="2859538"/>
+            <a:chOff x="1886679" y="197040"/>
+            <a:chExt cx="4892281" cy="2859538"/>
+          </a:xfrm>
+        </p:grpSpPr>
+        <p:sp>
+          <p:nvSpPr>
+            <p:cNvPr id="3" name="任意多边形 2"/>
+            <p:cNvSpPr/>
+            <p:nvPr/>
+          </p:nvSpPr>
+          <p:spPr>
+            <a:xfrm>
+              <a:off x="1886679" y="197040"/>
+              <a:ext cx="4840433" cy="2859538"/>
+            </a:xfrm>
+            <a:custGeom>
+              <a:avLst/>
+              <a:gdLst>
+                <a:gd name="connsiteX0" fmla="*/ 41709 w 4840433"/>
+                <a:gd name="connsiteY0" fmla="*/ 1532172 h 2859538"/>
+                <a:gd name="connsiteX1" fmla="*/ 132244 w 4840433"/>
+                <a:gd name="connsiteY1" fmla="*/ 907483 h 2859538"/>
+                <a:gd name="connsiteX2" fmla="*/ 503436 w 4840433"/>
+                <a:gd name="connsiteY2" fmla="*/ 644932 h 2859538"/>
+                <a:gd name="connsiteX3" fmla="*/ 1300141 w 4840433"/>
+                <a:gd name="connsiteY3" fmla="*/ 472916 h 2859538"/>
+                <a:gd name="connsiteX4" fmla="*/ 2151167 w 4840433"/>
+                <a:gd name="connsiteY4" fmla="*/ 554398 h 2859538"/>
+                <a:gd name="connsiteX5" fmla="*/ 3119887 w 4840433"/>
+                <a:gd name="connsiteY5" fmla="*/ 2136 h 2859538"/>
+                <a:gd name="connsiteX6" fmla="*/ 4613709 w 4840433"/>
+                <a:gd name="connsiteY6" fmla="*/ 789788 h 2859538"/>
+                <a:gd name="connsiteX7" fmla="*/ 4595602 w 4840433"/>
+                <a:gd name="connsiteY7" fmla="*/ 1912417 h 2859538"/>
+                <a:gd name="connsiteX8" fmla="*/ 4830992 w 4840433"/>
+                <a:gd name="connsiteY8" fmla="*/ 2165914 h 2859538"/>
+                <a:gd name="connsiteX9" fmla="*/ 4224410 w 4840433"/>
+                <a:gd name="connsiteY9" fmla="*/ 2681962 h 2859538"/>
+                <a:gd name="connsiteX10" fmla="*/ 3002192 w 4840433"/>
+                <a:gd name="connsiteY10" fmla="*/ 2193075 h 2859538"/>
+                <a:gd name="connsiteX11" fmla="*/ 1698493 w 4840433"/>
+                <a:gd name="connsiteY11" fmla="*/ 2256449 h 2859538"/>
+                <a:gd name="connsiteX12" fmla="*/ 765986 w 4840433"/>
+                <a:gd name="connsiteY12" fmla="*/ 2844924 h 2859538"/>
+                <a:gd name="connsiteX13" fmla="*/ 41709 w 4840433"/>
+                <a:gd name="connsiteY13" fmla="*/ 1532172 h 2859538"/>
+              </a:gdLst>
+              <a:ahLst/>
+              <a:cxnLst>
+                <a:cxn ang="0">
+                  <a:pos x="connsiteX0" y="connsiteY0"/>
+                </a:cxn>
+                <a:cxn ang="0">
+                  <a:pos x="connsiteX1" y="connsiteY1"/>
+                </a:cxn>
+                <a:cxn ang="0">
+                  <a:pos x="connsiteX2" y="connsiteY2"/>
+                </a:cxn>
+                <a:cxn ang="0">
+                  <a:pos x="connsiteX3" y="connsiteY3"/>
+                </a:cxn>
+                <a:cxn ang="0">
+                  <a:pos x="connsiteX4" y="connsiteY4"/>
+                </a:cxn>
+                <a:cxn ang="0">
+                  <a:pos x="connsiteX5" y="connsiteY5"/>
+                </a:cxn>
+                <a:cxn ang="0">
+                  <a:pos x="connsiteX6" y="connsiteY6"/>
+                </a:cxn>
+                <a:cxn ang="0">
+                  <a:pos x="connsiteX7" y="connsiteY7"/>
+                </a:cxn>
+                <a:cxn ang="0">
+                  <a:pos x="connsiteX8" y="connsiteY8"/>
+                </a:cxn>
+                <a:cxn ang="0">
+                  <a:pos x="connsiteX9" y="connsiteY9"/>
+                </a:cxn>
+                <a:cxn ang="0">
+                  <a:pos x="connsiteX10" y="connsiteY10"/>
+                </a:cxn>
+                <a:cxn ang="0">
+                  <a:pos x="connsiteX11" y="connsiteY11"/>
+                </a:cxn>
+                <a:cxn ang="0">
+                  <a:pos x="connsiteX12" y="connsiteY12"/>
+                </a:cxn>
+                <a:cxn ang="0">
+                  <a:pos x="connsiteX13" y="connsiteY13"/>
+                </a:cxn>
+              </a:cxnLst>
+              <a:rect l="l" t="t" r="r" b="b"/>
+              <a:pathLst>
+                <a:path w="4840433" h="2859538">
+                  <a:moveTo>
+                    <a:pt x="41709" y="1532172"/>
+                  </a:moveTo>
+                  <a:cubicBezTo>
+                    <a:pt x="-63915" y="1209265"/>
+                    <a:pt x="55290" y="1055356"/>
+                    <a:pt x="132244" y="907483"/>
+                  </a:cubicBezTo>
+                  <a:cubicBezTo>
+                    <a:pt x="209198" y="759610"/>
+                    <a:pt x="308787" y="717360"/>
+                    <a:pt x="503436" y="644932"/>
+                  </a:cubicBezTo>
+                  <a:cubicBezTo>
+                    <a:pt x="698086" y="572504"/>
+                    <a:pt x="1025519" y="488005"/>
+                    <a:pt x="1300141" y="472916"/>
+                  </a:cubicBezTo>
+                  <a:cubicBezTo>
+                    <a:pt x="1574763" y="457827"/>
+                    <a:pt x="1847876" y="632861"/>
+                    <a:pt x="2151167" y="554398"/>
+                  </a:cubicBezTo>
+                  <a:cubicBezTo>
+                    <a:pt x="2454458" y="475935"/>
+                    <a:pt x="2709463" y="-37096"/>
+                    <a:pt x="3119887" y="2136"/>
+                  </a:cubicBezTo>
+                  <a:cubicBezTo>
+                    <a:pt x="3530311" y="41368"/>
+                    <a:pt x="4367757" y="471408"/>
+                    <a:pt x="4613709" y="789788"/>
+                  </a:cubicBezTo>
+                  <a:cubicBezTo>
+                    <a:pt x="4859662" y="1108168"/>
+                    <a:pt x="4559388" y="1683063"/>
+                    <a:pt x="4595602" y="1912417"/>
+                  </a:cubicBezTo>
+                  <a:cubicBezTo>
+                    <a:pt x="4631816" y="2141771"/>
+                    <a:pt x="4892857" y="2037656"/>
+                    <a:pt x="4830992" y="2165914"/>
+                  </a:cubicBezTo>
+                  <a:cubicBezTo>
+                    <a:pt x="4769127" y="2294172"/>
+                    <a:pt x="4529210" y="2677435"/>
+                    <a:pt x="4224410" y="2681962"/>
+                  </a:cubicBezTo>
+                  <a:cubicBezTo>
+                    <a:pt x="3919610" y="2686489"/>
+                    <a:pt x="3423178" y="2263994"/>
+                    <a:pt x="3002192" y="2193075"/>
+                  </a:cubicBezTo>
+                  <a:cubicBezTo>
+                    <a:pt x="2581206" y="2122156"/>
+                    <a:pt x="2071194" y="2147808"/>
+                    <a:pt x="1698493" y="2256449"/>
+                  </a:cubicBezTo>
+                  <a:cubicBezTo>
+                    <a:pt x="1325792" y="2365090"/>
+                    <a:pt x="1039099" y="2959601"/>
+                    <a:pt x="765986" y="2844924"/>
+                  </a:cubicBezTo>
+                  <a:cubicBezTo>
+                    <a:pt x="492873" y="2730247"/>
+                    <a:pt x="147333" y="1855079"/>
+                    <a:pt x="41709" y="1532172"/>
+                  </a:cubicBezTo>
+                  <a:close/>
+                </a:path>
+              </a:pathLst>
+            </a:custGeom>
+            <a:noFill/>
+            <a:ln w="19050"/>
+          </p:spPr>
+          <p:style>
+            <a:lnRef idx="2">
+              <a:schemeClr val="dk1">
+                <a:shade val="50000"/>
+              </a:schemeClr>
+            </a:lnRef>
+            <a:fillRef idx="1">
+              <a:schemeClr val="dk1"/>
+            </a:fillRef>
+            <a:effectRef idx="0">
+              <a:schemeClr val="dk1"/>
+            </a:effectRef>
+            <a:fontRef idx="minor">
+              <a:schemeClr val="lt1"/>
+            </a:fontRef>
+          </p:style>
+          <p:txBody>
+            <a:bodyPr rtlCol="0" anchor="ctr"/>
+            <a:lstStyle/>
+            <a:p>
+              <a:pPr algn="ctr"/>
+              <a:endParaRPr lang="zh-CN" altLang="en-US">
+                <a:ln w="28575">
+                  <a:solidFill>
+                    <a:schemeClr val="tx1"/>
+                  </a:solidFill>
+                </a:ln>
+                <a:solidFill>
+                  <a:schemeClr val="tx1"/>
+                </a:solidFill>
+              </a:endParaRPr>
+            </a:p>
+          </p:txBody>
+        </p:sp>
+        <mc:AlternateContent xmlns:mc="http://schemas.openxmlformats.org/markup-compatibility/2006">
+          <mc:Choice xmlns:a14="http://schemas.microsoft.com/office/drawing/2010/main" Requires="a14">
+            <p:sp>
+              <p:nvSpPr>
+                <p:cNvPr id="4" name="任意多边形 3"/>
+                <p:cNvSpPr/>
+                <p:nvPr/>
+              </p:nvSpPr>
+              <p:spPr>
+                <a:xfrm>
+                  <a:off x="2088569" y="1210911"/>
+                  <a:ext cx="592787" cy="495093"/>
+                </a:xfrm>
+                <a:custGeom>
+                  <a:avLst/>
+                  <a:gdLst>
+                    <a:gd name="connsiteX0" fmla="*/ 24616 w 592787"/>
+                    <a:gd name="connsiteY0" fmla="*/ 289840 h 495093"/>
+                    <a:gd name="connsiteX1" fmla="*/ 78937 w 592787"/>
+                    <a:gd name="connsiteY1" fmla="*/ 99717 h 495093"/>
+                    <a:gd name="connsiteX2" fmla="*/ 287167 w 592787"/>
+                    <a:gd name="connsiteY2" fmla="*/ 129 h 495093"/>
+                    <a:gd name="connsiteX3" fmla="*/ 585931 w 592787"/>
+                    <a:gd name="connsiteY3" fmla="*/ 90664 h 495093"/>
+                    <a:gd name="connsiteX4" fmla="*/ 459183 w 592787"/>
+                    <a:gd name="connsiteY4" fmla="*/ 489016 h 495093"/>
+                    <a:gd name="connsiteX5" fmla="*/ 24616 w 592787"/>
+                    <a:gd name="connsiteY5" fmla="*/ 289840 h 495093"/>
+                  </a:gdLst>
+                  <a:ahLst/>
+                  <a:cxnLst>
+                    <a:cxn ang="0">
+                      <a:pos x="connsiteX0" y="connsiteY0"/>
+                    </a:cxn>
+                    <a:cxn ang="0">
+                      <a:pos x="connsiteX1" y="connsiteY1"/>
+                    </a:cxn>
+                    <a:cxn ang="0">
+                      <a:pos x="connsiteX2" y="connsiteY2"/>
+                    </a:cxn>
+                    <a:cxn ang="0">
+                      <a:pos x="connsiteX3" y="connsiteY3"/>
+                    </a:cxn>
+                    <a:cxn ang="0">
+                      <a:pos x="connsiteX4" y="connsiteY4"/>
+                    </a:cxn>
+                    <a:cxn ang="0">
+                      <a:pos x="connsiteX5" y="connsiteY5"/>
+                    </a:cxn>
+                  </a:cxnLst>
+                  <a:rect l="l" t="t" r="r" b="b"/>
+                  <a:pathLst>
+                    <a:path w="592787" h="495093">
+                      <a:moveTo>
+                        <a:pt x="24616" y="289840"/>
+                      </a:moveTo>
+                      <a:cubicBezTo>
+                        <a:pt x="-38758" y="224957"/>
+                        <a:pt x="35179" y="148002"/>
+                        <a:pt x="78937" y="99717"/>
+                      </a:cubicBezTo>
+                      <a:cubicBezTo>
+                        <a:pt x="122696" y="51432"/>
+                        <a:pt x="202668" y="1638"/>
+                        <a:pt x="287167" y="129"/>
+                      </a:cubicBezTo>
+                      <a:cubicBezTo>
+                        <a:pt x="371666" y="-1380"/>
+                        <a:pt x="557262" y="9183"/>
+                        <a:pt x="585931" y="90664"/>
+                      </a:cubicBezTo>
+                      <a:cubicBezTo>
+                        <a:pt x="614600" y="172145"/>
+                        <a:pt x="549718" y="448275"/>
+                        <a:pt x="459183" y="489016"/>
+                      </a:cubicBezTo>
+                      <a:cubicBezTo>
+                        <a:pt x="368648" y="529757"/>
+                        <a:pt x="87990" y="354723"/>
+                        <a:pt x="24616" y="289840"/>
+                      </a:cubicBezTo>
+                      <a:close/>
+                    </a:path>
+                  </a:pathLst>
+                </a:custGeom>
+              </p:spPr>
+              <p:style>
+                <a:lnRef idx="2">
+                  <a:schemeClr val="accent1">
+                    <a:shade val="50000"/>
+                  </a:schemeClr>
+                </a:lnRef>
+                <a:fillRef idx="1">
+                  <a:schemeClr val="accent1"/>
+                </a:fillRef>
+                <a:effectRef idx="0">
+                  <a:schemeClr val="accent1"/>
+                </a:effectRef>
+                <a:fontRef idx="minor">
+                  <a:schemeClr val="lt1"/>
+                </a:fontRef>
+              </p:style>
+              <p:txBody>
+                <a:bodyPr rtlCol="0" anchor="ctr"/>
+                <a:lstStyle/>
+                <a:p>
+                  <a:pPr algn="ctr"/>
+                  <a14:m>
+                    <m:oMathPara xmlns:m="http://schemas.openxmlformats.org/officeDocument/2006/math">
+                      <m:oMathParaPr>
+                        <m:jc m:val="centerGroup"/>
+                      </m:oMathParaPr>
+                      <m:oMath xmlns:m="http://schemas.openxmlformats.org/officeDocument/2006/math">
+                        <m:sSub>
+                          <m:sSubPr>
+                            <m:ctrlPr>
+                              <a:rPr lang="en-US" altLang="zh-CN" i="1" smtClean="0">
+                                <a:latin typeface="Cambria Math" panose="02040503050406030204" pitchFamily="18" charset="0"/>
+                              </a:rPr>
+                            </m:ctrlPr>
+                          </m:sSubPr>
+                          <m:e>
+                            <m:r>
+                              <a:rPr lang="en-US" altLang="zh-CN" b="0" i="1" smtClean="0">
+                                <a:latin typeface="Cambria Math" panose="02040503050406030204" pitchFamily="18" charset="0"/>
+                              </a:rPr>
+                              <m:t>  </m:t>
+                            </m:r>
+                            <m:r>
+                              <m:rPr>
+                                <m:sty m:val="p"/>
+                              </m:rPr>
+                              <a:rPr lang="en-US" altLang="zh-CN" i="1">
+                                <a:latin typeface="Cambria Math" panose="02040503050406030204" pitchFamily="18" charset="0"/>
+                              </a:rPr>
+                              <m:t>S</m:t>
+                            </m:r>
+                          </m:e>
+                          <m:sub>
+                            <m:r>
+                              <a:rPr lang="en-US" altLang="zh-CN" b="0" i="1" smtClean="0">
+                                <a:latin typeface="Cambria Math" panose="02040503050406030204" pitchFamily="18" charset="0"/>
+                              </a:rPr>
+                              <m:t>1</m:t>
+                            </m:r>
+                          </m:sub>
+                        </m:sSub>
+                      </m:oMath>
+                    </m:oMathPara>
+                  </a14:m>
+                  <a:endParaRPr lang="zh-CN" altLang="en-US" dirty="0"/>
+                </a:p>
+              </p:txBody>
+            </p:sp>
+          </mc:Choice>
+          <mc:Fallback>
+            <p:sp>
+              <p:nvSpPr>
+                <p:cNvPr id="4" name="任意多边形 3"/>
+                <p:cNvSpPr>
+                  <a:spLocks noRot="1" noChangeAspect="1" noMove="1" noResize="1" noEditPoints="1" noAdjustHandles="1" noChangeArrowheads="1" noChangeShapeType="1" noTextEdit="1"/>
+                </p:cNvSpPr>
+                <p:nvPr/>
+              </p:nvSpPr>
+              <p:spPr>
+                <a:xfrm>
+                  <a:off x="2088569" y="1210911"/>
+                  <a:ext cx="592787" cy="495093"/>
+                </a:xfrm>
+                <a:custGeom>
+                  <a:avLst/>
+                  <a:gdLst>
+                    <a:gd name="connsiteX0" fmla="*/ 24616 w 592787"/>
+                    <a:gd name="connsiteY0" fmla="*/ 289840 h 495093"/>
+                    <a:gd name="connsiteX1" fmla="*/ 78937 w 592787"/>
+                    <a:gd name="connsiteY1" fmla="*/ 99717 h 495093"/>
+                    <a:gd name="connsiteX2" fmla="*/ 287167 w 592787"/>
+                    <a:gd name="connsiteY2" fmla="*/ 129 h 495093"/>
+                    <a:gd name="connsiteX3" fmla="*/ 585931 w 592787"/>
+                    <a:gd name="connsiteY3" fmla="*/ 90664 h 495093"/>
+                    <a:gd name="connsiteX4" fmla="*/ 459183 w 592787"/>
+                    <a:gd name="connsiteY4" fmla="*/ 489016 h 495093"/>
+                    <a:gd name="connsiteX5" fmla="*/ 24616 w 592787"/>
+                    <a:gd name="connsiteY5" fmla="*/ 289840 h 495093"/>
+                  </a:gdLst>
+                  <a:ahLst/>
+                  <a:cxnLst>
+                    <a:cxn ang="0">
+                      <a:pos x="connsiteX0" y="connsiteY0"/>
+                    </a:cxn>
+                    <a:cxn ang="0">
+                      <a:pos x="connsiteX1" y="connsiteY1"/>
+                    </a:cxn>
+                    <a:cxn ang="0">
+                      <a:pos x="connsiteX2" y="connsiteY2"/>
+                    </a:cxn>
+                    <a:cxn ang="0">
+                      <a:pos x="connsiteX3" y="connsiteY3"/>
+                    </a:cxn>
+                    <a:cxn ang="0">
+                      <a:pos x="connsiteX4" y="connsiteY4"/>
+                    </a:cxn>
+                    <a:cxn ang="0">
+                      <a:pos x="connsiteX5" y="connsiteY5"/>
+                    </a:cxn>
+                  </a:cxnLst>
+                  <a:rect l="l" t="t" r="r" b="b"/>
+                  <a:pathLst>
+                    <a:path w="592787" h="495093">
+                      <a:moveTo>
+                        <a:pt x="24616" y="289840"/>
+                      </a:moveTo>
+                      <a:cubicBezTo>
+                        <a:pt x="-38758" y="224957"/>
+                        <a:pt x="35179" y="148002"/>
+                        <a:pt x="78937" y="99717"/>
+                      </a:cubicBezTo>
+                      <a:cubicBezTo>
+                        <a:pt x="122696" y="51432"/>
+                        <a:pt x="202668" y="1638"/>
+                        <a:pt x="287167" y="129"/>
+                      </a:cubicBezTo>
+                      <a:cubicBezTo>
+                        <a:pt x="371666" y="-1380"/>
+                        <a:pt x="557262" y="9183"/>
+                        <a:pt x="585931" y="90664"/>
+                      </a:cubicBezTo>
+                      <a:cubicBezTo>
+                        <a:pt x="614600" y="172145"/>
+                        <a:pt x="549718" y="448275"/>
+                        <a:pt x="459183" y="489016"/>
+                      </a:cubicBezTo>
+                      <a:cubicBezTo>
+                        <a:pt x="368648" y="529757"/>
+                        <a:pt x="87990" y="354723"/>
+                        <a:pt x="24616" y="289840"/>
+                      </a:cubicBezTo>
+                      <a:close/>
+                    </a:path>
+                  </a:pathLst>
+                </a:custGeom>
+                <a:blipFill rotWithShape="0">
+                  <a:blip r:embed="rId3"/>
+                  <a:stretch>
+                    <a:fillRect/>
+                  </a:stretch>
+                </a:blipFill>
+              </p:spPr>
+              <p:txBody>
+                <a:bodyPr/>
+                <a:lstStyle/>
+                <a:p>
+                  <a:r>
+                    <a:rPr lang="zh-CN" altLang="en-US">
+                      <a:noFill/>
+                    </a:rPr>
+                    <a:t> </a:t>
+                  </a:r>
+                </a:p>
+              </p:txBody>
+            </p:sp>
+          </mc:Fallback>
+        </mc:AlternateContent>
+        <p:sp>
+          <p:nvSpPr>
+            <p:cNvPr id="5" name="任意多边形 4"/>
+            <p:cNvSpPr/>
+            <p:nvPr/>
+          </p:nvSpPr>
+          <p:spPr>
+            <a:xfrm>
+              <a:off x="2314920" y="1871867"/>
+              <a:ext cx="891720" cy="951805"/>
+            </a:xfrm>
+            <a:custGeom>
+              <a:avLst/>
+              <a:gdLst>
+                <a:gd name="connsiteX0" fmla="*/ 11821 w 891720"/>
+                <a:gd name="connsiteY0" fmla="*/ 174216 h 951805"/>
+                <a:gd name="connsiteX1" fmla="*/ 238157 w 891720"/>
+                <a:gd name="connsiteY1" fmla="*/ 807959 h 951805"/>
+                <a:gd name="connsiteX2" fmla="*/ 500708 w 891720"/>
+                <a:gd name="connsiteY2" fmla="*/ 943761 h 951805"/>
+                <a:gd name="connsiteX3" fmla="*/ 890007 w 891720"/>
+                <a:gd name="connsiteY3" fmla="*/ 654050 h 951805"/>
+                <a:gd name="connsiteX4" fmla="*/ 618403 w 891720"/>
+                <a:gd name="connsiteY4" fmla="*/ 29361 h 951805"/>
+                <a:gd name="connsiteX5" fmla="*/ 11821 w 891720"/>
+                <a:gd name="connsiteY5" fmla="*/ 174216 h 951805"/>
+              </a:gdLst>
+              <a:ahLst/>
+              <a:cxnLst>
+                <a:cxn ang="0">
+                  <a:pos x="connsiteX0" y="connsiteY0"/>
+                </a:cxn>
+                <a:cxn ang="0">
+                  <a:pos x="connsiteX1" y="connsiteY1"/>
+                </a:cxn>
+                <a:cxn ang="0">
+                  <a:pos x="connsiteX2" y="connsiteY2"/>
+                </a:cxn>
+                <a:cxn ang="0">
+                  <a:pos x="connsiteX3" y="connsiteY3"/>
+                </a:cxn>
+                <a:cxn ang="0">
+                  <a:pos x="connsiteX4" y="connsiteY4"/>
+                </a:cxn>
+                <a:cxn ang="0">
+                  <a:pos x="connsiteX5" y="connsiteY5"/>
+                </a:cxn>
+              </a:cxnLst>
+              <a:rect l="l" t="t" r="r" b="b"/>
+              <a:pathLst>
+                <a:path w="891720" h="951805">
+                  <a:moveTo>
+                    <a:pt x="11821" y="174216"/>
+                  </a:moveTo>
+                  <a:cubicBezTo>
+                    <a:pt x="-51553" y="303982"/>
+                    <a:pt x="156676" y="679702"/>
+                    <a:pt x="238157" y="807959"/>
+                  </a:cubicBezTo>
+                  <a:cubicBezTo>
+                    <a:pt x="319638" y="936216"/>
+                    <a:pt x="392066" y="969413"/>
+                    <a:pt x="500708" y="943761"/>
+                  </a:cubicBezTo>
+                  <a:cubicBezTo>
+                    <a:pt x="609350" y="918110"/>
+                    <a:pt x="870391" y="806450"/>
+                    <a:pt x="890007" y="654050"/>
+                  </a:cubicBezTo>
+                  <a:cubicBezTo>
+                    <a:pt x="909623" y="501650"/>
+                    <a:pt x="757223" y="109333"/>
+                    <a:pt x="618403" y="29361"/>
+                  </a:cubicBezTo>
+                  <a:cubicBezTo>
+                    <a:pt x="479583" y="-50611"/>
+                    <a:pt x="75195" y="44450"/>
+                    <a:pt x="11821" y="174216"/>
+                  </a:cubicBezTo>
+                  <a:close/>
+                </a:path>
+              </a:pathLst>
+            </a:custGeom>
+          </p:spPr>
+          <p:style>
+            <a:lnRef idx="2">
+              <a:schemeClr val="accent1">
+                <a:shade val="50000"/>
+              </a:schemeClr>
+            </a:lnRef>
+            <a:fillRef idx="1">
+              <a:schemeClr val="accent1"/>
+            </a:fillRef>
+            <a:effectRef idx="0">
+              <a:schemeClr val="accent1"/>
+            </a:effectRef>
+            <a:fontRef idx="minor">
+              <a:schemeClr val="lt1"/>
+            </a:fontRef>
+          </p:style>
+          <p:txBody>
+            <a:bodyPr rtlCol="0" anchor="ctr"/>
+            <a:lstStyle/>
+            <a:p>
+              <a:pPr algn="ctr"/>
+              <a:r>
+                <a:rPr lang="en-US" altLang="zh-CN" dirty="0" smtClean="0"/>
+                <a:t>…</a:t>
+              </a:r>
+              <a:endParaRPr lang="zh-CN" altLang="en-US" dirty="0"/>
+            </a:p>
+          </p:txBody>
+        </p:sp>
+        <mc:AlternateContent xmlns:mc="http://schemas.openxmlformats.org/markup-compatibility/2006">
+          <mc:Choice xmlns:a14="http://schemas.microsoft.com/office/drawing/2010/main" Requires="a14">
+            <p:sp>
+              <p:nvSpPr>
+                <p:cNvPr id="6" name="任意多边形 5"/>
+                <p:cNvSpPr/>
+                <p:nvPr/>
+              </p:nvSpPr>
+              <p:spPr>
+                <a:xfrm>
+                  <a:off x="3034754" y="751069"/>
+                  <a:ext cx="472923" cy="789072"/>
+                </a:xfrm>
+                <a:custGeom>
+                  <a:avLst/>
+                  <a:gdLst>
+                    <a:gd name="connsiteX0" fmla="*/ 224585 w 472923"/>
+                    <a:gd name="connsiteY0" fmla="*/ 67472 h 789072"/>
+                    <a:gd name="connsiteX1" fmla="*/ 34463 w 472923"/>
+                    <a:gd name="connsiteY1" fmla="*/ 85579 h 789072"/>
+                    <a:gd name="connsiteX2" fmla="*/ 43516 w 472923"/>
+                    <a:gd name="connsiteY2" fmla="*/ 583520 h 789072"/>
+                    <a:gd name="connsiteX3" fmla="*/ 469029 w 472923"/>
+                    <a:gd name="connsiteY3" fmla="*/ 764589 h 789072"/>
+                    <a:gd name="connsiteX4" fmla="*/ 224585 w 472923"/>
+                    <a:gd name="connsiteY4" fmla="*/ 67472 h 789072"/>
+                  </a:gdLst>
+                  <a:ahLst/>
+                  <a:cxnLst>
+                    <a:cxn ang="0">
+                      <a:pos x="connsiteX0" y="connsiteY0"/>
+                    </a:cxn>
+                    <a:cxn ang="0">
+                      <a:pos x="connsiteX1" y="connsiteY1"/>
+                    </a:cxn>
+                    <a:cxn ang="0">
+                      <a:pos x="connsiteX2" y="connsiteY2"/>
+                    </a:cxn>
+                    <a:cxn ang="0">
+                      <a:pos x="connsiteX3" y="connsiteY3"/>
+                    </a:cxn>
+                    <a:cxn ang="0">
+                      <a:pos x="connsiteX4" y="connsiteY4"/>
+                    </a:cxn>
+                  </a:cxnLst>
+                  <a:rect l="l" t="t" r="r" b="b"/>
+                  <a:pathLst>
+                    <a:path w="472923" h="789072">
+                      <a:moveTo>
+                        <a:pt x="224585" y="67472"/>
+                      </a:moveTo>
+                      <a:cubicBezTo>
+                        <a:pt x="152157" y="-45696"/>
+                        <a:pt x="64641" y="-429"/>
+                        <a:pt x="34463" y="85579"/>
+                      </a:cubicBezTo>
+                      <a:cubicBezTo>
+                        <a:pt x="4285" y="171587"/>
+                        <a:pt x="-28912" y="470352"/>
+                        <a:pt x="43516" y="583520"/>
+                      </a:cubicBezTo>
+                      <a:cubicBezTo>
+                        <a:pt x="115944" y="696688"/>
+                        <a:pt x="434324" y="849088"/>
+                        <a:pt x="469029" y="764589"/>
+                      </a:cubicBezTo>
+                      <a:cubicBezTo>
+                        <a:pt x="503734" y="680090"/>
+                        <a:pt x="297013" y="180640"/>
+                        <a:pt x="224585" y="67472"/>
+                      </a:cubicBezTo>
+                      <a:close/>
+                    </a:path>
+                  </a:pathLst>
+                </a:custGeom>
+              </p:spPr>
+              <p:style>
+                <a:lnRef idx="2">
+                  <a:schemeClr val="accent1">
+                    <a:shade val="50000"/>
+                  </a:schemeClr>
+                </a:lnRef>
+                <a:fillRef idx="1">
+                  <a:schemeClr val="accent1"/>
+                </a:fillRef>
+                <a:effectRef idx="0">
+                  <a:schemeClr val="accent1"/>
+                </a:effectRef>
+                <a:fontRef idx="minor">
+                  <a:schemeClr val="lt1"/>
+                </a:fontRef>
+              </p:style>
+              <p:txBody>
+                <a:bodyPr rtlCol="0" anchor="ctr"/>
+                <a:lstStyle/>
+                <a:p>
+                  <a:pPr algn="ctr"/>
+                  <a14:m>
+                    <m:oMathPara xmlns:m="http://schemas.openxmlformats.org/officeDocument/2006/math">
+                      <m:oMathParaPr>
+                        <m:jc m:val="centerGroup"/>
+                      </m:oMathParaPr>
+                      <m:oMath xmlns:m="http://schemas.openxmlformats.org/officeDocument/2006/math">
+                        <m:sSub>
+                          <m:sSubPr>
+                            <m:ctrlPr>
+                              <a:rPr lang="en-US" altLang="zh-CN" i="1" smtClean="0">
+                                <a:latin typeface="Cambria Math" panose="02040503050406030204" pitchFamily="18" charset="0"/>
+                              </a:rPr>
+                            </m:ctrlPr>
+                          </m:sSubPr>
+                          <m:e>
+                            <m:r>
+                              <a:rPr lang="en-US" altLang="zh-CN" i="1">
+                                <a:latin typeface="Cambria Math" panose="02040503050406030204" pitchFamily="18" charset="0"/>
+                              </a:rPr>
+                              <m:t>  </m:t>
+                            </m:r>
+                            <m:r>
+                              <m:rPr>
+                                <m:sty m:val="p"/>
+                              </m:rPr>
+                              <a:rPr lang="en-US" altLang="zh-CN" i="1">
+                                <a:latin typeface="Cambria Math" panose="02040503050406030204" pitchFamily="18" charset="0"/>
+                              </a:rPr>
+                              <m:t>S</m:t>
+                            </m:r>
+                          </m:e>
+                          <m:sub>
+                            <m:r>
+                              <a:rPr lang="en-US" altLang="zh-CN" b="0" i="1" smtClean="0">
+                                <a:latin typeface="Cambria Math" panose="02040503050406030204" pitchFamily="18" charset="0"/>
+                              </a:rPr>
+                              <m:t>2</m:t>
+                            </m:r>
+                          </m:sub>
+                        </m:sSub>
+                      </m:oMath>
+                    </m:oMathPara>
+                  </a14:m>
+                  <a:endParaRPr lang="zh-CN" altLang="en-US" dirty="0"/>
+                </a:p>
+              </p:txBody>
+            </p:sp>
+          </mc:Choice>
+          <mc:Fallback>
+            <p:sp>
+              <p:nvSpPr>
+                <p:cNvPr id="6" name="任意多边形 5"/>
+                <p:cNvSpPr>
+                  <a:spLocks noRot="1" noChangeAspect="1" noMove="1" noResize="1" noEditPoints="1" noAdjustHandles="1" noChangeArrowheads="1" noChangeShapeType="1" noTextEdit="1"/>
+                </p:cNvSpPr>
+                <p:nvPr/>
+              </p:nvSpPr>
+              <p:spPr>
+                <a:xfrm>
+                  <a:off x="3034754" y="751069"/>
+                  <a:ext cx="472923" cy="789072"/>
+                </a:xfrm>
+                <a:custGeom>
+                  <a:avLst/>
+                  <a:gdLst>
+                    <a:gd name="connsiteX0" fmla="*/ 224585 w 472923"/>
+                    <a:gd name="connsiteY0" fmla="*/ 67472 h 789072"/>
+                    <a:gd name="connsiteX1" fmla="*/ 34463 w 472923"/>
+                    <a:gd name="connsiteY1" fmla="*/ 85579 h 789072"/>
+                    <a:gd name="connsiteX2" fmla="*/ 43516 w 472923"/>
+                    <a:gd name="connsiteY2" fmla="*/ 583520 h 789072"/>
+                    <a:gd name="connsiteX3" fmla="*/ 469029 w 472923"/>
+                    <a:gd name="connsiteY3" fmla="*/ 764589 h 789072"/>
+                    <a:gd name="connsiteX4" fmla="*/ 224585 w 472923"/>
+                    <a:gd name="connsiteY4" fmla="*/ 67472 h 789072"/>
+                  </a:gdLst>
+                  <a:ahLst/>
+                  <a:cxnLst>
+                    <a:cxn ang="0">
+                      <a:pos x="connsiteX0" y="connsiteY0"/>
+                    </a:cxn>
+                    <a:cxn ang="0">
+                      <a:pos x="connsiteX1" y="connsiteY1"/>
+                    </a:cxn>
+                    <a:cxn ang="0">
+                      <a:pos x="connsiteX2" y="connsiteY2"/>
+                    </a:cxn>
+                    <a:cxn ang="0">
+                      <a:pos x="connsiteX3" y="connsiteY3"/>
+                    </a:cxn>
+                    <a:cxn ang="0">
+                      <a:pos x="connsiteX4" y="connsiteY4"/>
+                    </a:cxn>
+                  </a:cxnLst>
+                  <a:rect l="l" t="t" r="r" b="b"/>
+                  <a:pathLst>
+                    <a:path w="472923" h="789072">
+                      <a:moveTo>
+                        <a:pt x="224585" y="67472"/>
+                      </a:moveTo>
+                      <a:cubicBezTo>
+                        <a:pt x="152157" y="-45696"/>
+                        <a:pt x="64641" y="-429"/>
+                        <a:pt x="34463" y="85579"/>
+                      </a:cubicBezTo>
+                      <a:cubicBezTo>
+                        <a:pt x="4285" y="171587"/>
+                        <a:pt x="-28912" y="470352"/>
+                        <a:pt x="43516" y="583520"/>
+                      </a:cubicBezTo>
+                      <a:cubicBezTo>
+                        <a:pt x="115944" y="696688"/>
+                        <a:pt x="434324" y="849088"/>
+                        <a:pt x="469029" y="764589"/>
+                      </a:cubicBezTo>
+                      <a:cubicBezTo>
+                        <a:pt x="503734" y="680090"/>
+                        <a:pt x="297013" y="180640"/>
+                        <a:pt x="224585" y="67472"/>
+                      </a:cubicBezTo>
+                      <a:close/>
+                    </a:path>
+                  </a:pathLst>
+                </a:custGeom>
+                <a:blipFill rotWithShape="0">
+                  <a:blip r:embed="rId4"/>
+                  <a:stretch>
+                    <a:fillRect/>
+                  </a:stretch>
+                </a:blipFill>
+              </p:spPr>
+              <p:txBody>
+                <a:bodyPr/>
+                <a:lstStyle/>
+                <a:p>
+                  <a:r>
+                    <a:rPr lang="zh-CN" altLang="en-US">
+                      <a:noFill/>
+                    </a:rPr>
+                    <a:t> </a:t>
+                  </a:r>
+                </a:p>
+              </p:txBody>
+            </p:sp>
+          </mc:Fallback>
+        </mc:AlternateContent>
+        <p:sp>
+          <p:nvSpPr>
+            <p:cNvPr id="8" name="任意多边形 7"/>
+            <p:cNvSpPr/>
+            <p:nvPr/>
+          </p:nvSpPr>
+          <p:spPr>
+            <a:xfrm>
+              <a:off x="3204376" y="1602832"/>
+              <a:ext cx="670778" cy="764497"/>
+            </a:xfrm>
+            <a:custGeom>
+              <a:avLst/>
+              <a:gdLst>
+                <a:gd name="connsiteX0" fmla="*/ 55999 w 670778"/>
+                <a:gd name="connsiteY0" fmla="*/ 62709 h 764497"/>
+                <a:gd name="connsiteX1" fmla="*/ 237069 w 670778"/>
+                <a:gd name="connsiteY1" fmla="*/ 8388 h 764497"/>
+                <a:gd name="connsiteX2" fmla="*/ 608261 w 670778"/>
+                <a:gd name="connsiteY2" fmla="*/ 153244 h 764497"/>
+                <a:gd name="connsiteX3" fmla="*/ 653528 w 670778"/>
+                <a:gd name="connsiteY3" fmla="*/ 651184 h 764497"/>
+                <a:gd name="connsiteX4" fmla="*/ 427191 w 670778"/>
+                <a:gd name="connsiteY4" fmla="*/ 750773 h 764497"/>
+                <a:gd name="connsiteX5" fmla="*/ 28839 w 670778"/>
+                <a:gd name="connsiteY5" fmla="*/ 433901 h 764497"/>
+                <a:gd name="connsiteX6" fmla="*/ 55999 w 670778"/>
+                <a:gd name="connsiteY6" fmla="*/ 62709 h 764497"/>
+              </a:gdLst>
+              <a:ahLst/>
+              <a:cxnLst>
+                <a:cxn ang="0">
+                  <a:pos x="connsiteX0" y="connsiteY0"/>
+                </a:cxn>
+                <a:cxn ang="0">
+                  <a:pos x="connsiteX1" y="connsiteY1"/>
+                </a:cxn>
+                <a:cxn ang="0">
+                  <a:pos x="connsiteX2" y="connsiteY2"/>
+                </a:cxn>
+                <a:cxn ang="0">
+                  <a:pos x="connsiteX3" y="connsiteY3"/>
+                </a:cxn>
+                <a:cxn ang="0">
+                  <a:pos x="connsiteX4" y="connsiteY4"/>
+                </a:cxn>
+                <a:cxn ang="0">
+                  <a:pos x="connsiteX5" y="connsiteY5"/>
+                </a:cxn>
+                <a:cxn ang="0">
+                  <a:pos x="connsiteX6" y="connsiteY6"/>
+                </a:cxn>
+              </a:cxnLst>
+              <a:rect l="l" t="t" r="r" b="b"/>
+              <a:pathLst>
+                <a:path w="670778" h="764497">
+                  <a:moveTo>
+                    <a:pt x="55999" y="62709"/>
+                  </a:moveTo>
+                  <a:cubicBezTo>
+                    <a:pt x="90704" y="-8210"/>
+                    <a:pt x="145026" y="-6701"/>
+                    <a:pt x="237069" y="8388"/>
+                  </a:cubicBezTo>
+                  <a:cubicBezTo>
+                    <a:pt x="329112" y="23477"/>
+                    <a:pt x="538851" y="46111"/>
+                    <a:pt x="608261" y="153244"/>
+                  </a:cubicBezTo>
+                  <a:cubicBezTo>
+                    <a:pt x="677671" y="260377"/>
+                    <a:pt x="683706" y="551596"/>
+                    <a:pt x="653528" y="651184"/>
+                  </a:cubicBezTo>
+                  <a:cubicBezTo>
+                    <a:pt x="623350" y="750772"/>
+                    <a:pt x="531306" y="786987"/>
+                    <a:pt x="427191" y="750773"/>
+                  </a:cubicBezTo>
+                  <a:cubicBezTo>
+                    <a:pt x="323076" y="714559"/>
+                    <a:pt x="92213" y="547069"/>
+                    <a:pt x="28839" y="433901"/>
+                  </a:cubicBezTo>
+                  <a:cubicBezTo>
+                    <a:pt x="-34535" y="320733"/>
+                    <a:pt x="21294" y="133628"/>
+                    <a:pt x="55999" y="62709"/>
+                  </a:cubicBezTo>
+                  <a:close/>
+                </a:path>
+              </a:pathLst>
+            </a:custGeom>
+          </p:spPr>
+          <p:style>
+            <a:lnRef idx="2">
+              <a:schemeClr val="accent1">
+                <a:shade val="50000"/>
+              </a:schemeClr>
+            </a:lnRef>
+            <a:fillRef idx="1">
+              <a:schemeClr val="accent1"/>
+            </a:fillRef>
+            <a:effectRef idx="0">
+              <a:schemeClr val="accent1"/>
+            </a:effectRef>
+            <a:fontRef idx="minor">
+              <a:schemeClr val="lt1"/>
+            </a:fontRef>
+          </p:style>
+          <p:txBody>
+            <a:bodyPr rtlCol="0" anchor="ctr"/>
+            <a:lstStyle/>
+            <a:p>
+              <a:pPr algn="ctr"/>
+              <a:r>
+                <a:rPr lang="en-US" altLang="zh-CN" dirty="0" smtClean="0"/>
+                <a:t>…</a:t>
+              </a:r>
+              <a:endParaRPr lang="zh-CN" altLang="en-US" dirty="0"/>
+            </a:p>
+          </p:txBody>
+        </p:sp>
+        <mc:AlternateContent xmlns:mc="http://schemas.openxmlformats.org/markup-compatibility/2006">
+          <mc:Choice xmlns:a14="http://schemas.microsoft.com/office/drawing/2010/main" Requires="a14">
+            <p:sp>
+              <p:nvSpPr>
+                <p:cNvPr id="11" name="任意多边形 10"/>
+                <p:cNvSpPr/>
+                <p:nvPr/>
+              </p:nvSpPr>
+              <p:spPr>
+                <a:xfrm>
+                  <a:off x="3755488" y="796705"/>
+                  <a:ext cx="783853" cy="1539907"/>
+                </a:xfrm>
+                <a:custGeom>
+                  <a:avLst/>
+                  <a:gdLst>
+                    <a:gd name="connsiteX0" fmla="*/ 4263 w 840737"/>
+                    <a:gd name="connsiteY0" fmla="*/ 63815 h 1603722"/>
+                    <a:gd name="connsiteX1" fmla="*/ 266814 w 840737"/>
+                    <a:gd name="connsiteY1" fmla="*/ 788092 h 1603722"/>
+                    <a:gd name="connsiteX2" fmla="*/ 574632 w 840737"/>
+                    <a:gd name="connsiteY2" fmla="*/ 1530476 h 1603722"/>
+                    <a:gd name="connsiteX3" fmla="*/ 837182 w 840737"/>
+                    <a:gd name="connsiteY3" fmla="*/ 1485209 h 1603722"/>
+                    <a:gd name="connsiteX4" fmla="*/ 710434 w 840737"/>
+                    <a:gd name="connsiteY4" fmla="*/ 724718 h 1603722"/>
+                    <a:gd name="connsiteX5" fmla="*/ 484097 w 840737"/>
+                    <a:gd name="connsiteY5" fmla="*/ 109082 h 1603722"/>
+                    <a:gd name="connsiteX6" fmla="*/ 4263 w 840737"/>
+                    <a:gd name="connsiteY6" fmla="*/ 63815 h 1603722"/>
+                  </a:gdLst>
+                  <a:ahLst/>
+                  <a:cxnLst>
+                    <a:cxn ang="0">
+                      <a:pos x="connsiteX0" y="connsiteY0"/>
+                    </a:cxn>
+                    <a:cxn ang="0">
+                      <a:pos x="connsiteX1" y="connsiteY1"/>
+                    </a:cxn>
+                    <a:cxn ang="0">
+                      <a:pos x="connsiteX2" y="connsiteY2"/>
+                    </a:cxn>
+                    <a:cxn ang="0">
+                      <a:pos x="connsiteX3" y="connsiteY3"/>
+                    </a:cxn>
+                    <a:cxn ang="0">
+                      <a:pos x="connsiteX4" y="connsiteY4"/>
+                    </a:cxn>
+                    <a:cxn ang="0">
+                      <a:pos x="connsiteX5" y="connsiteY5"/>
+                    </a:cxn>
+                    <a:cxn ang="0">
+                      <a:pos x="connsiteX6" y="connsiteY6"/>
+                    </a:cxn>
+                  </a:cxnLst>
+                  <a:rect l="l" t="t" r="r" b="b"/>
+                  <a:pathLst>
+                    <a:path w="840737" h="1603722">
+                      <a:moveTo>
+                        <a:pt x="4263" y="63815"/>
+                      </a:moveTo>
+                      <a:cubicBezTo>
+                        <a:pt x="-31951" y="176983"/>
+                        <a:pt x="171753" y="543649"/>
+                        <a:pt x="266814" y="788092"/>
+                      </a:cubicBezTo>
+                      <a:cubicBezTo>
+                        <a:pt x="361875" y="1032535"/>
+                        <a:pt x="479571" y="1414290"/>
+                        <a:pt x="574632" y="1530476"/>
+                      </a:cubicBezTo>
+                      <a:cubicBezTo>
+                        <a:pt x="669693" y="1646662"/>
+                        <a:pt x="814548" y="1619502"/>
+                        <a:pt x="837182" y="1485209"/>
+                      </a:cubicBezTo>
+                      <a:cubicBezTo>
+                        <a:pt x="859816" y="1350916"/>
+                        <a:pt x="769281" y="954072"/>
+                        <a:pt x="710434" y="724718"/>
+                      </a:cubicBezTo>
+                      <a:cubicBezTo>
+                        <a:pt x="651587" y="495364"/>
+                        <a:pt x="595756" y="216215"/>
+                        <a:pt x="484097" y="109082"/>
+                      </a:cubicBezTo>
+                      <a:cubicBezTo>
+                        <a:pt x="372438" y="1949"/>
+                        <a:pt x="40477" y="-49353"/>
+                        <a:pt x="4263" y="63815"/>
+                      </a:cubicBezTo>
+                      <a:close/>
+                    </a:path>
+                  </a:pathLst>
+                </a:custGeom>
+              </p:spPr>
+              <p:style>
+                <a:lnRef idx="2">
+                  <a:schemeClr val="accent1">
+                    <a:shade val="50000"/>
+                  </a:schemeClr>
+                </a:lnRef>
+                <a:fillRef idx="1">
+                  <a:schemeClr val="accent1"/>
+                </a:fillRef>
+                <a:effectRef idx="0">
+                  <a:schemeClr val="accent1"/>
+                </a:effectRef>
+                <a:fontRef idx="minor">
+                  <a:schemeClr val="lt1"/>
+                </a:fontRef>
+              </p:style>
+              <p:txBody>
+                <a:bodyPr rtlCol="0" anchor="ctr"/>
+                <a:lstStyle/>
+                <a:p>
+                  <a:pPr algn="ctr"/>
+                  <a14:m>
+                    <m:oMathPara xmlns:m="http://schemas.openxmlformats.org/officeDocument/2006/math">
+                      <m:oMathParaPr>
+                        <m:jc m:val="centerGroup"/>
+                      </m:oMathParaPr>
+                      <m:oMath xmlns:m="http://schemas.openxmlformats.org/officeDocument/2006/math">
+                        <m:sSub>
+                          <m:sSubPr>
+                            <m:ctrlPr>
+                              <a:rPr lang="en-US" altLang="zh-CN" i="1" smtClean="0">
+                                <a:latin typeface="Cambria Math" panose="02040503050406030204" pitchFamily="18" charset="0"/>
+                              </a:rPr>
+                            </m:ctrlPr>
+                          </m:sSubPr>
+                          <m:e>
+                            <m:r>
+                              <a:rPr lang="en-US" altLang="zh-CN" i="1">
+                                <a:latin typeface="Cambria Math" panose="02040503050406030204" pitchFamily="18" charset="0"/>
+                              </a:rPr>
+                              <m:t>  </m:t>
+                            </m:r>
+                            <m:r>
+                              <a:rPr lang="en-US" altLang="zh-CN" b="0" i="1" smtClean="0">
+                                <a:latin typeface="Cambria Math" panose="02040503050406030204" pitchFamily="18" charset="0"/>
+                              </a:rPr>
+                              <m:t>   </m:t>
+                            </m:r>
+                            <m:r>
+                              <m:rPr>
+                                <m:sty m:val="p"/>
+                              </m:rPr>
+                              <a:rPr lang="en-US" altLang="zh-CN" i="1">
+                                <a:latin typeface="Cambria Math" panose="02040503050406030204" pitchFamily="18" charset="0"/>
+                              </a:rPr>
+                              <m:t>S</m:t>
+                            </m:r>
+                          </m:e>
+                          <m:sub>
+                            <m:r>
+                              <a:rPr lang="en-US" altLang="zh-CN" b="0" i="1" smtClean="0">
+                                <a:latin typeface="Cambria Math" panose="02040503050406030204" pitchFamily="18" charset="0"/>
+                              </a:rPr>
+                              <m:t>3</m:t>
+                            </m:r>
+                          </m:sub>
+                        </m:sSub>
+                      </m:oMath>
+                    </m:oMathPara>
+                  </a14:m>
+                  <a:endParaRPr lang="zh-CN" altLang="en-US" dirty="0"/>
+                </a:p>
+              </p:txBody>
+            </p:sp>
+          </mc:Choice>
+          <mc:Fallback>
+            <p:sp>
+              <p:nvSpPr>
+                <p:cNvPr id="11" name="任意多边形 10"/>
+                <p:cNvSpPr>
+                  <a:spLocks noRot="1" noChangeAspect="1" noMove="1" noResize="1" noEditPoints="1" noAdjustHandles="1" noChangeArrowheads="1" noChangeShapeType="1" noTextEdit="1"/>
+                </p:cNvSpPr>
+                <p:nvPr/>
+              </p:nvSpPr>
+              <p:spPr>
+                <a:xfrm>
+                  <a:off x="3755488" y="796705"/>
+                  <a:ext cx="783853" cy="1539907"/>
+                </a:xfrm>
+                <a:custGeom>
+                  <a:avLst/>
+                  <a:gdLst>
+                    <a:gd name="connsiteX0" fmla="*/ 4263 w 840737"/>
+                    <a:gd name="connsiteY0" fmla="*/ 63815 h 1603722"/>
+                    <a:gd name="connsiteX1" fmla="*/ 266814 w 840737"/>
+                    <a:gd name="connsiteY1" fmla="*/ 788092 h 1603722"/>
+                    <a:gd name="connsiteX2" fmla="*/ 574632 w 840737"/>
+                    <a:gd name="connsiteY2" fmla="*/ 1530476 h 1603722"/>
+                    <a:gd name="connsiteX3" fmla="*/ 837182 w 840737"/>
+                    <a:gd name="connsiteY3" fmla="*/ 1485209 h 1603722"/>
+                    <a:gd name="connsiteX4" fmla="*/ 710434 w 840737"/>
+                    <a:gd name="connsiteY4" fmla="*/ 724718 h 1603722"/>
+                    <a:gd name="connsiteX5" fmla="*/ 484097 w 840737"/>
+                    <a:gd name="connsiteY5" fmla="*/ 109082 h 1603722"/>
+                    <a:gd name="connsiteX6" fmla="*/ 4263 w 840737"/>
+                    <a:gd name="connsiteY6" fmla="*/ 63815 h 1603722"/>
+                  </a:gdLst>
+                  <a:ahLst/>
+                  <a:cxnLst>
+                    <a:cxn ang="0">
+                      <a:pos x="connsiteX0" y="connsiteY0"/>
+                    </a:cxn>
+                    <a:cxn ang="0">
+                      <a:pos x="connsiteX1" y="connsiteY1"/>
+                    </a:cxn>
+                    <a:cxn ang="0">
+                      <a:pos x="connsiteX2" y="connsiteY2"/>
+                    </a:cxn>
+                    <a:cxn ang="0">
+                      <a:pos x="connsiteX3" y="connsiteY3"/>
+                    </a:cxn>
+                    <a:cxn ang="0">
+                      <a:pos x="connsiteX4" y="connsiteY4"/>
+                    </a:cxn>
+                    <a:cxn ang="0">
+                      <a:pos x="connsiteX5" y="connsiteY5"/>
+                    </a:cxn>
+                    <a:cxn ang="0">
+                      <a:pos x="connsiteX6" y="connsiteY6"/>
+                    </a:cxn>
+                  </a:cxnLst>
+                  <a:rect l="l" t="t" r="r" b="b"/>
+                  <a:pathLst>
+                    <a:path w="840737" h="1603722">
+                      <a:moveTo>
+                        <a:pt x="4263" y="63815"/>
+                      </a:moveTo>
+                      <a:cubicBezTo>
+                        <a:pt x="-31951" y="176983"/>
+                        <a:pt x="171753" y="543649"/>
+                        <a:pt x="266814" y="788092"/>
+                      </a:cubicBezTo>
+                      <a:cubicBezTo>
+                        <a:pt x="361875" y="1032535"/>
+                        <a:pt x="479571" y="1414290"/>
+                        <a:pt x="574632" y="1530476"/>
+                      </a:cubicBezTo>
+                      <a:cubicBezTo>
+                        <a:pt x="669693" y="1646662"/>
+                        <a:pt x="814548" y="1619502"/>
+                        <a:pt x="837182" y="1485209"/>
+                      </a:cubicBezTo>
+                      <a:cubicBezTo>
+                        <a:pt x="859816" y="1350916"/>
+                        <a:pt x="769281" y="954072"/>
+                        <a:pt x="710434" y="724718"/>
+                      </a:cubicBezTo>
+                      <a:cubicBezTo>
+                        <a:pt x="651587" y="495364"/>
+                        <a:pt x="595756" y="216215"/>
+                        <a:pt x="484097" y="109082"/>
+                      </a:cubicBezTo>
+                      <a:cubicBezTo>
+                        <a:pt x="372438" y="1949"/>
+                        <a:pt x="40477" y="-49353"/>
+                        <a:pt x="4263" y="63815"/>
+                      </a:cubicBezTo>
+                      <a:close/>
+                    </a:path>
+                  </a:pathLst>
+                </a:custGeom>
+                <a:blipFill rotWithShape="0">
+                  <a:blip r:embed="rId5"/>
+                  <a:stretch>
+                    <a:fillRect/>
+                  </a:stretch>
+                </a:blipFill>
+              </p:spPr>
+              <p:txBody>
+                <a:bodyPr/>
+                <a:lstStyle/>
+                <a:p>
+                  <a:r>
+                    <a:rPr lang="zh-CN" altLang="en-US">
+                      <a:noFill/>
+                    </a:rPr>
+                    <a:t> </a:t>
+                  </a:r>
+                </a:p>
+              </p:txBody>
+            </p:sp>
+          </mc:Fallback>
+        </mc:AlternateContent>
+        <mc:AlternateContent xmlns:mc="http://schemas.openxmlformats.org/markup-compatibility/2006">
+          <mc:Choice xmlns:a14="http://schemas.microsoft.com/office/drawing/2010/main" Requires="a14">
+            <p:sp>
+              <p:nvSpPr>
+                <p:cNvPr id="13" name="任意多边形 12"/>
+                <p:cNvSpPr/>
+                <p:nvPr/>
+              </p:nvSpPr>
+              <p:spPr>
+                <a:xfrm>
+                  <a:off x="4532868" y="389163"/>
+                  <a:ext cx="1530484" cy="1054793"/>
+                </a:xfrm>
+                <a:custGeom>
+                  <a:avLst/>
+                  <a:gdLst>
+                    <a:gd name="connsiteX0" fmla="*/ 247362 w 1530484"/>
+                    <a:gd name="connsiteY0" fmla="*/ 136 h 1054793"/>
+                    <a:gd name="connsiteX1" fmla="*/ 21025 w 1530484"/>
+                    <a:gd name="connsiteY1" fmla="*/ 190259 h 1054793"/>
+                    <a:gd name="connsiteX2" fmla="*/ 66292 w 1530484"/>
+                    <a:gd name="connsiteY2" fmla="*/ 579558 h 1054793"/>
+                    <a:gd name="connsiteX3" fmla="*/ 518966 w 1530484"/>
+                    <a:gd name="connsiteY3" fmla="*/ 1050338 h 1054793"/>
+                    <a:gd name="connsiteX4" fmla="*/ 1505793 w 1530484"/>
+                    <a:gd name="connsiteY4" fmla="*/ 778734 h 1054793"/>
+                    <a:gd name="connsiteX5" fmla="*/ 1152708 w 1530484"/>
+                    <a:gd name="connsiteY5" fmla="*/ 172152 h 1054793"/>
+                    <a:gd name="connsiteX6" fmla="*/ 247362 w 1530484"/>
+                    <a:gd name="connsiteY6" fmla="*/ 136 h 1054793"/>
+                  </a:gdLst>
+                  <a:ahLst/>
+                  <a:cxnLst>
+                    <a:cxn ang="0">
+                      <a:pos x="connsiteX0" y="connsiteY0"/>
+                    </a:cxn>
+                    <a:cxn ang="0">
+                      <a:pos x="connsiteX1" y="connsiteY1"/>
+                    </a:cxn>
+                    <a:cxn ang="0">
+                      <a:pos x="connsiteX2" y="connsiteY2"/>
+                    </a:cxn>
+                    <a:cxn ang="0">
+                      <a:pos x="connsiteX3" y="connsiteY3"/>
+                    </a:cxn>
+                    <a:cxn ang="0">
+                      <a:pos x="connsiteX4" y="connsiteY4"/>
+                    </a:cxn>
+                    <a:cxn ang="0">
+                      <a:pos x="connsiteX5" y="connsiteY5"/>
+                    </a:cxn>
+                    <a:cxn ang="0">
+                      <a:pos x="connsiteX6" y="connsiteY6"/>
+                    </a:cxn>
+                  </a:cxnLst>
+                  <a:rect l="l" t="t" r="r" b="b"/>
+                  <a:pathLst>
+                    <a:path w="1530484" h="1054793">
+                      <a:moveTo>
+                        <a:pt x="247362" y="136"/>
+                      </a:moveTo>
+                      <a:cubicBezTo>
+                        <a:pt x="58748" y="3154"/>
+                        <a:pt x="51203" y="93689"/>
+                        <a:pt x="21025" y="190259"/>
+                      </a:cubicBezTo>
+                      <a:cubicBezTo>
+                        <a:pt x="-9153" y="286829"/>
+                        <a:pt x="-16698" y="436212"/>
+                        <a:pt x="66292" y="579558"/>
+                      </a:cubicBezTo>
+                      <a:cubicBezTo>
+                        <a:pt x="149282" y="722905"/>
+                        <a:pt x="279049" y="1017142"/>
+                        <a:pt x="518966" y="1050338"/>
+                      </a:cubicBezTo>
+                      <a:cubicBezTo>
+                        <a:pt x="758883" y="1083534"/>
+                        <a:pt x="1400169" y="925098"/>
+                        <a:pt x="1505793" y="778734"/>
+                      </a:cubicBezTo>
+                      <a:cubicBezTo>
+                        <a:pt x="1611417" y="632370"/>
+                        <a:pt x="1356411" y="300409"/>
+                        <a:pt x="1152708" y="172152"/>
+                      </a:cubicBezTo>
+                      <a:cubicBezTo>
+                        <a:pt x="949005" y="43895"/>
+                        <a:pt x="435976" y="-2882"/>
+                        <a:pt x="247362" y="136"/>
+                      </a:cubicBezTo>
+                      <a:close/>
+                    </a:path>
+                  </a:pathLst>
+                </a:custGeom>
+              </p:spPr>
+              <p:style>
+                <a:lnRef idx="2">
+                  <a:schemeClr val="accent1">
+                    <a:shade val="50000"/>
+                  </a:schemeClr>
+                </a:lnRef>
+                <a:fillRef idx="1">
+                  <a:schemeClr val="accent1"/>
+                </a:fillRef>
+                <a:effectRef idx="0">
+                  <a:schemeClr val="accent1"/>
+                </a:effectRef>
+                <a:fontRef idx="minor">
+                  <a:schemeClr val="lt1"/>
+                </a:fontRef>
+              </p:style>
+              <p:txBody>
+                <a:bodyPr rtlCol="0" anchor="ctr"/>
+                <a:lstStyle/>
+                <a:p>
+                  <a:pPr algn="ctr"/>
+                  <a14:m>
+                    <m:oMathPara xmlns:m="http://schemas.openxmlformats.org/officeDocument/2006/math">
+                      <m:oMathParaPr>
+                        <m:jc m:val="centerGroup"/>
+                      </m:oMathParaPr>
+                      <m:oMath xmlns:m="http://schemas.openxmlformats.org/officeDocument/2006/math">
+                        <m:sSub>
+                          <m:sSubPr>
+                            <m:ctrlPr>
+                              <a:rPr lang="en-US" altLang="zh-CN" i="1" smtClean="0">
+                                <a:latin typeface="Cambria Math" panose="02040503050406030204" pitchFamily="18" charset="0"/>
+                              </a:rPr>
+                            </m:ctrlPr>
+                          </m:sSubPr>
+                          <m:e>
+                            <m:r>
+                              <a:rPr lang="en-US" altLang="zh-CN" i="1">
+                                <a:latin typeface="Cambria Math" panose="02040503050406030204" pitchFamily="18" charset="0"/>
+                              </a:rPr>
+                              <m:t>  </m:t>
+                            </m:r>
+                            <m:r>
+                              <m:rPr>
+                                <m:sty m:val="p"/>
+                              </m:rPr>
+                              <a:rPr lang="en-US" altLang="zh-CN" i="1">
+                                <a:latin typeface="Cambria Math" panose="02040503050406030204" pitchFamily="18" charset="0"/>
+                              </a:rPr>
+                              <m:t>S</m:t>
+                            </m:r>
+                          </m:e>
+                          <m:sub>
+                            <m:r>
+                              <a:rPr lang="en-US" altLang="zh-CN" b="0" i="1" smtClean="0">
+                                <a:latin typeface="Cambria Math" panose="02040503050406030204" pitchFamily="18" charset="0"/>
+                              </a:rPr>
+                              <m:t>4</m:t>
+                            </m:r>
+                          </m:sub>
+                        </m:sSub>
+                      </m:oMath>
+                    </m:oMathPara>
+                  </a14:m>
+                  <a:endParaRPr lang="zh-CN" altLang="en-US" dirty="0"/>
+                </a:p>
+              </p:txBody>
+            </p:sp>
+          </mc:Choice>
+          <mc:Fallback>
+            <p:sp>
+              <p:nvSpPr>
+                <p:cNvPr id="13" name="任意多边形 12"/>
+                <p:cNvSpPr>
+                  <a:spLocks noRot="1" noChangeAspect="1" noMove="1" noResize="1" noEditPoints="1" noAdjustHandles="1" noChangeArrowheads="1" noChangeShapeType="1" noTextEdit="1"/>
+                </p:cNvSpPr>
+                <p:nvPr/>
+              </p:nvSpPr>
+              <p:spPr>
+                <a:xfrm>
+                  <a:off x="4532868" y="389163"/>
+                  <a:ext cx="1530484" cy="1054793"/>
+                </a:xfrm>
+                <a:custGeom>
+                  <a:avLst/>
+                  <a:gdLst>
+                    <a:gd name="connsiteX0" fmla="*/ 247362 w 1530484"/>
+                    <a:gd name="connsiteY0" fmla="*/ 136 h 1054793"/>
+                    <a:gd name="connsiteX1" fmla="*/ 21025 w 1530484"/>
+                    <a:gd name="connsiteY1" fmla="*/ 190259 h 1054793"/>
+                    <a:gd name="connsiteX2" fmla="*/ 66292 w 1530484"/>
+                    <a:gd name="connsiteY2" fmla="*/ 579558 h 1054793"/>
+                    <a:gd name="connsiteX3" fmla="*/ 518966 w 1530484"/>
+                    <a:gd name="connsiteY3" fmla="*/ 1050338 h 1054793"/>
+                    <a:gd name="connsiteX4" fmla="*/ 1505793 w 1530484"/>
+                    <a:gd name="connsiteY4" fmla="*/ 778734 h 1054793"/>
+                    <a:gd name="connsiteX5" fmla="*/ 1152708 w 1530484"/>
+                    <a:gd name="connsiteY5" fmla="*/ 172152 h 1054793"/>
+                    <a:gd name="connsiteX6" fmla="*/ 247362 w 1530484"/>
+                    <a:gd name="connsiteY6" fmla="*/ 136 h 1054793"/>
+                  </a:gdLst>
+                  <a:ahLst/>
+                  <a:cxnLst>
+                    <a:cxn ang="0">
+                      <a:pos x="connsiteX0" y="connsiteY0"/>
+                    </a:cxn>
+                    <a:cxn ang="0">
+                      <a:pos x="connsiteX1" y="connsiteY1"/>
+                    </a:cxn>
+                    <a:cxn ang="0">
+                      <a:pos x="connsiteX2" y="connsiteY2"/>
+                    </a:cxn>
+                    <a:cxn ang="0">
+                      <a:pos x="connsiteX3" y="connsiteY3"/>
+                    </a:cxn>
+                    <a:cxn ang="0">
+                      <a:pos x="connsiteX4" y="connsiteY4"/>
+                    </a:cxn>
+                    <a:cxn ang="0">
+                      <a:pos x="connsiteX5" y="connsiteY5"/>
+                    </a:cxn>
+                    <a:cxn ang="0">
+                      <a:pos x="connsiteX6" y="connsiteY6"/>
+                    </a:cxn>
+                  </a:cxnLst>
+                  <a:rect l="l" t="t" r="r" b="b"/>
+                  <a:pathLst>
+                    <a:path w="1530484" h="1054793">
+                      <a:moveTo>
+                        <a:pt x="247362" y="136"/>
+                      </a:moveTo>
+                      <a:cubicBezTo>
+                        <a:pt x="58748" y="3154"/>
+                        <a:pt x="51203" y="93689"/>
+                        <a:pt x="21025" y="190259"/>
+                      </a:cubicBezTo>
+                      <a:cubicBezTo>
+                        <a:pt x="-9153" y="286829"/>
+                        <a:pt x="-16698" y="436212"/>
+                        <a:pt x="66292" y="579558"/>
+                      </a:cubicBezTo>
+                      <a:cubicBezTo>
+                        <a:pt x="149282" y="722905"/>
+                        <a:pt x="279049" y="1017142"/>
+                        <a:pt x="518966" y="1050338"/>
+                      </a:cubicBezTo>
+                      <a:cubicBezTo>
+                        <a:pt x="758883" y="1083534"/>
+                        <a:pt x="1400169" y="925098"/>
+                        <a:pt x="1505793" y="778734"/>
+                      </a:cubicBezTo>
+                      <a:cubicBezTo>
+                        <a:pt x="1611417" y="632370"/>
+                        <a:pt x="1356411" y="300409"/>
+                        <a:pt x="1152708" y="172152"/>
+                      </a:cubicBezTo>
+                      <a:cubicBezTo>
+                        <a:pt x="949005" y="43895"/>
+                        <a:pt x="435976" y="-2882"/>
+                        <a:pt x="247362" y="136"/>
+                      </a:cubicBezTo>
+                      <a:close/>
+                    </a:path>
+                  </a:pathLst>
+                </a:custGeom>
+                <a:blipFill rotWithShape="0">
+                  <a:blip r:embed="rId6"/>
+                  <a:stretch>
+                    <a:fillRect/>
+                  </a:stretch>
+                </a:blipFill>
+              </p:spPr>
+              <p:txBody>
+                <a:bodyPr/>
+                <a:lstStyle/>
+                <a:p>
+                  <a:r>
+                    <a:rPr lang="zh-CN" altLang="en-US">
+                      <a:noFill/>
+                    </a:rPr>
+                    <a:t> </a:t>
+                  </a:r>
+                </a:p>
+              </p:txBody>
+            </p:sp>
+          </mc:Fallback>
+        </mc:AlternateContent>
+        <p:sp>
+          <p:nvSpPr>
+            <p:cNvPr id="24" name="任意多边形 23"/>
+            <p:cNvSpPr/>
+            <p:nvPr/>
+          </p:nvSpPr>
+          <p:spPr>
+            <a:xfrm>
+              <a:off x="4956906" y="1610213"/>
+              <a:ext cx="1487709" cy="986126"/>
+            </a:xfrm>
+            <a:custGeom>
+              <a:avLst/>
+              <a:gdLst>
+                <a:gd name="connsiteX0" fmla="*/ 149248 w 1487709"/>
+                <a:gd name="connsiteY0" fmla="*/ 1304 h 986126"/>
+                <a:gd name="connsiteX1" fmla="*/ 22500 w 1487709"/>
+                <a:gd name="connsiteY1" fmla="*/ 91838 h 986126"/>
+                <a:gd name="connsiteX2" fmla="*/ 167355 w 1487709"/>
+                <a:gd name="connsiteY2" fmla="*/ 598833 h 986126"/>
+                <a:gd name="connsiteX3" fmla="*/ 638136 w 1487709"/>
+                <a:gd name="connsiteY3" fmla="*/ 933811 h 986126"/>
+                <a:gd name="connsiteX4" fmla="*/ 1389573 w 1487709"/>
+                <a:gd name="connsiteY4" fmla="*/ 951918 h 986126"/>
+                <a:gd name="connsiteX5" fmla="*/ 1443894 w 1487709"/>
+                <a:gd name="connsiteY5" fmla="*/ 607886 h 986126"/>
+                <a:gd name="connsiteX6" fmla="*/ 1371466 w 1487709"/>
+                <a:gd name="connsiteY6" fmla="*/ 109945 h 986126"/>
+                <a:gd name="connsiteX7" fmla="*/ 149248 w 1487709"/>
+                <a:gd name="connsiteY7" fmla="*/ 1304 h 986126"/>
+              </a:gdLst>
+              <a:ahLst/>
+              <a:cxnLst>
+                <a:cxn ang="0">
+                  <a:pos x="connsiteX0" y="connsiteY0"/>
+                </a:cxn>
+                <a:cxn ang="0">
+                  <a:pos x="connsiteX1" y="connsiteY1"/>
+                </a:cxn>
+                <a:cxn ang="0">
+                  <a:pos x="connsiteX2" y="connsiteY2"/>
+                </a:cxn>
+                <a:cxn ang="0">
+                  <a:pos x="connsiteX3" y="connsiteY3"/>
+                </a:cxn>
+                <a:cxn ang="0">
+                  <a:pos x="connsiteX4" y="connsiteY4"/>
+                </a:cxn>
+                <a:cxn ang="0">
+                  <a:pos x="connsiteX5" y="connsiteY5"/>
+                </a:cxn>
+                <a:cxn ang="0">
+                  <a:pos x="connsiteX6" y="connsiteY6"/>
+                </a:cxn>
+                <a:cxn ang="0">
+                  <a:pos x="connsiteX7" y="connsiteY7"/>
+                </a:cxn>
+              </a:cxnLst>
+              <a:rect l="l" t="t" r="r" b="b"/>
+              <a:pathLst>
+                <a:path w="1487709" h="986126">
+                  <a:moveTo>
+                    <a:pt x="149248" y="1304"/>
+                  </a:moveTo>
+                  <a:cubicBezTo>
+                    <a:pt x="-75580" y="-1714"/>
+                    <a:pt x="19482" y="-7750"/>
+                    <a:pt x="22500" y="91838"/>
+                  </a:cubicBezTo>
+                  <a:cubicBezTo>
+                    <a:pt x="25518" y="191426"/>
+                    <a:pt x="64749" y="458504"/>
+                    <a:pt x="167355" y="598833"/>
+                  </a:cubicBezTo>
+                  <a:cubicBezTo>
+                    <a:pt x="269961" y="739162"/>
+                    <a:pt x="434433" y="874964"/>
+                    <a:pt x="638136" y="933811"/>
+                  </a:cubicBezTo>
+                  <a:cubicBezTo>
+                    <a:pt x="841839" y="992658"/>
+                    <a:pt x="1255280" y="1006239"/>
+                    <a:pt x="1389573" y="951918"/>
+                  </a:cubicBezTo>
+                  <a:cubicBezTo>
+                    <a:pt x="1523866" y="897597"/>
+                    <a:pt x="1446912" y="748215"/>
+                    <a:pt x="1443894" y="607886"/>
+                  </a:cubicBezTo>
+                  <a:cubicBezTo>
+                    <a:pt x="1440876" y="467557"/>
+                    <a:pt x="1582713" y="212551"/>
+                    <a:pt x="1371466" y="109945"/>
+                  </a:cubicBezTo>
+                  <a:cubicBezTo>
+                    <a:pt x="1160219" y="7339"/>
+                    <a:pt x="374076" y="4322"/>
+                    <a:pt x="149248" y="1304"/>
+                  </a:cubicBezTo>
+                  <a:close/>
+                </a:path>
+              </a:pathLst>
+            </a:custGeom>
+          </p:spPr>
+          <p:style>
+            <a:lnRef idx="2">
+              <a:schemeClr val="accent1">
+                <a:shade val="50000"/>
+              </a:schemeClr>
+            </a:lnRef>
+            <a:fillRef idx="1">
+              <a:schemeClr val="accent1"/>
+            </a:fillRef>
+            <a:effectRef idx="0">
+              <a:schemeClr val="accent1"/>
+            </a:effectRef>
+            <a:fontRef idx="minor">
+              <a:schemeClr val="lt1"/>
+            </a:fontRef>
+          </p:style>
+          <p:txBody>
+            <a:bodyPr rtlCol="0" anchor="ctr"/>
+            <a:lstStyle/>
+            <a:p>
+              <a:pPr algn="ctr"/>
+              <a:r>
+                <a:rPr lang="en-US" altLang="zh-CN" dirty="0" smtClean="0"/>
+                <a:t>…</a:t>
+              </a:r>
+              <a:endParaRPr lang="zh-CN" altLang="en-US" dirty="0"/>
+            </a:p>
+          </p:txBody>
+        </p:sp>
+        <mc:AlternateContent xmlns:mc="http://schemas.openxmlformats.org/markup-compatibility/2006">
+          <mc:Choice xmlns:a14="http://schemas.microsoft.com/office/drawing/2010/main" Requires="a14">
+            <p:sp>
+              <p:nvSpPr>
+                <p:cNvPr id="29" name="文本框 28"/>
+                <p:cNvSpPr txBox="1"/>
+                <p:nvPr/>
+              </p:nvSpPr>
+              <p:spPr>
+                <a:xfrm>
+                  <a:off x="5830536" y="1215779"/>
+                  <a:ext cx="948424" cy="369332"/>
+                </a:xfrm>
+                <a:prstGeom prst="rect">
+                  <a:avLst/>
+                </a:prstGeom>
+                <a:noFill/>
+              </p:spPr>
+              <p:txBody>
+                <a:bodyPr wrap="square" rtlCol="0">
+                  <a:spAutoFit/>
+                </a:bodyPr>
+                <a:lstStyle/>
+                <a:p>
+                  <a14:m>
+                    <m:oMathPara xmlns:m="http://schemas.openxmlformats.org/officeDocument/2006/math">
+                      <m:oMathParaPr>
+                        <m:jc m:val="centerGroup"/>
+                      </m:oMathParaPr>
+                      <m:oMath xmlns:m="http://schemas.openxmlformats.org/officeDocument/2006/math">
+                        <m:r>
+                          <a:rPr lang="en-US" altLang="zh-CN" b="0" i="1" smtClean="0">
+                            <a:latin typeface="Cambria Math" panose="02040503050406030204" pitchFamily="18" charset="0"/>
+                          </a:rPr>
+                          <m:t>𝑀</m:t>
+                        </m:r>
+                      </m:oMath>
+                    </m:oMathPara>
+                  </a14:m>
+                  <a:endParaRPr lang="zh-CN" altLang="en-US" dirty="0"/>
+                </a:p>
+              </p:txBody>
+            </p:sp>
+          </mc:Choice>
+          <mc:Fallback>
+            <p:sp>
+              <p:nvSpPr>
+                <p:cNvPr id="29" name="文本框 28"/>
+                <p:cNvSpPr txBox="1">
+                  <a:spLocks noRot="1" noChangeAspect="1" noMove="1" noResize="1" noEditPoints="1" noAdjustHandles="1" noChangeArrowheads="1" noChangeShapeType="1" noTextEdit="1"/>
+                </p:cNvSpPr>
+                <p:nvPr/>
+              </p:nvSpPr>
+              <p:spPr>
+                <a:xfrm>
+                  <a:off x="5830536" y="1215779"/>
+                  <a:ext cx="948424" cy="369332"/>
+                </a:xfrm>
+                <a:prstGeom prst="rect">
+                  <a:avLst/>
+                </a:prstGeom>
+                <a:blipFill rotWithShape="0">
+                  <a:blip r:embed="rId7"/>
+                  <a:stretch>
+                    <a:fillRect/>
+                  </a:stretch>
+                </a:blipFill>
+              </p:spPr>
+              <p:txBody>
+                <a:bodyPr/>
+                <a:lstStyle/>
+                <a:p>
+                  <a:r>
+                    <a:rPr lang="zh-CN" altLang="en-US">
+                      <a:noFill/>
+                    </a:rPr>
+                    <a:t> </a:t>
+                  </a:r>
+                </a:p>
+              </p:txBody>
+            </p:sp>
+          </mc:Fallback>
+        </mc:AlternateContent>
+      </p:grpSp>
     </p:spTree>
     <p:extLst>
       <p:ext uri="{BB962C8B-B14F-4D97-AF65-F5344CB8AC3E}">

</xml_diff>